<commit_message>
new order in presentation
</commit_message>
<xml_diff>
--- a/docs/mobile_meshviewer_praezi.pptx
+++ b/docs/mobile_meshviewer_praezi.pptx
@@ -11,9 +11,9 @@
     <p:sldId id="256" r:id="rId2"/>
     <p:sldId id="257" r:id="rId3"/>
     <p:sldId id="258" r:id="rId4"/>
-    <p:sldId id="279" r:id="rId5"/>
-    <p:sldId id="277" r:id="rId6"/>
-    <p:sldId id="278" r:id="rId7"/>
+    <p:sldId id="277" r:id="rId5"/>
+    <p:sldId id="278" r:id="rId6"/>
+    <p:sldId id="279" r:id="rId7"/>
     <p:sldId id="259" r:id="rId8"/>
     <p:sldId id="264" r:id="rId9"/>
     <p:sldId id="260" r:id="rId10"/>
@@ -138,7 +138,7 @@
   </p:defaultTextStyle>
   <p:extLst>
     <p:ext uri="{EFAFB233-063F-42B5-8137-9DF3F51BA10A}">
-      <p15:sldGuideLst xmlns:p15="http://schemas.microsoft.com/office/powerpoint/2012/main" xmlns="">
+      <p15:sldGuideLst xmlns="" xmlns:p15="http://schemas.microsoft.com/office/powerpoint/2012/main">
         <p15:guide id="1" orient="horz" pos="1620">
           <p15:clr>
             <a:srgbClr val="A4A3A4"/>
@@ -579,7 +579,7 @@
     </p:spTree>
     <p:extLst>
       <p:ext uri="{BB962C8B-B14F-4D97-AF65-F5344CB8AC3E}">
-        <p14:creationId xmlns:p14="http://schemas.microsoft.com/office/powerpoint/2010/main" xmlns="" val="1131456817"/>
+        <p14:creationId xmlns="" xmlns:p14="http://schemas.microsoft.com/office/powerpoint/2010/main" val="1131456817"/>
       </p:ext>
     </p:extLst>
   </p:cSld>
@@ -749,7 +749,7 @@
     </p:spTree>
     <p:extLst>
       <p:ext uri="{BB962C8B-B14F-4D97-AF65-F5344CB8AC3E}">
-        <p14:creationId xmlns:p14="http://schemas.microsoft.com/office/powerpoint/2010/main" xmlns="" val="2146320146"/>
+        <p14:creationId xmlns="" xmlns:p14="http://schemas.microsoft.com/office/powerpoint/2010/main" val="2146320146"/>
       </p:ext>
     </p:extLst>
   </p:cSld>
@@ -954,7 +954,7 @@
     </p:spTree>
     <p:extLst>
       <p:ext uri="{BB962C8B-B14F-4D97-AF65-F5344CB8AC3E}">
-        <p14:creationId xmlns:p14="http://schemas.microsoft.com/office/powerpoint/2010/main" xmlns="" val="1303368238"/>
+        <p14:creationId xmlns="" xmlns:p14="http://schemas.microsoft.com/office/powerpoint/2010/main" val="1303368238"/>
       </p:ext>
     </p:extLst>
   </p:cSld>
@@ -1212,7 +1212,7 @@
     </p:spTree>
     <p:extLst>
       <p:ext uri="{BB962C8B-B14F-4D97-AF65-F5344CB8AC3E}">
-        <p14:creationId xmlns:p14="http://schemas.microsoft.com/office/powerpoint/2010/main" xmlns="" val="2695209887"/>
+        <p14:creationId xmlns="" xmlns:p14="http://schemas.microsoft.com/office/powerpoint/2010/main" val="2695209887"/>
       </p:ext>
     </p:extLst>
   </p:cSld>
@@ -1642,16 +1642,28 @@
               <a:t>	</a:t>
             </a:r>
             <a:r>
-              <a:rPr lang="de-DE" dirty="0" err="1" smtClean="0"/>
+              <a:rPr lang="de-DE" dirty="0" smtClean="0"/>
+              <a:t>Variablen</a:t>
+            </a:r>
+            <a:r>
+              <a:rPr lang="de-DE" baseline="0" dirty="0" smtClean="0"/>
+              <a:t> </a:t>
+            </a:r>
+            <a:r>
+              <a:rPr lang="de-DE" baseline="0" dirty="0" smtClean="0"/>
+              <a:t>und Objekte initialisieren, Mocks erstellen usw</a:t>
+            </a:r>
+            <a:r>
+              <a:rPr lang="de-DE" baseline="0" dirty="0" smtClean="0"/>
+              <a:t>. (</a:t>
+            </a:r>
+            <a:r>
+              <a:rPr lang="de-DE" baseline="0" dirty="0" err="1" smtClean="0"/>
               <a:t>given</a:t>
             </a:r>
             <a:r>
-              <a:rPr lang="de-DE" dirty="0" smtClean="0"/>
-              <a:t>, Variablen</a:t>
-            </a:r>
-            <a:r>
               <a:rPr lang="de-DE" baseline="0" dirty="0" smtClean="0"/>
-              <a:t> und Objekte initialisieren, Mocks erstellen usw.</a:t>
+              <a:t>)</a:t>
             </a:r>
             <a:endParaRPr lang="de-DE" dirty="0" smtClean="0"/>
           </a:p>
@@ -2693,7 +2705,7 @@
     </p:spTree>
     <p:extLst>
       <p:ext uri="{BB962C8B-B14F-4D97-AF65-F5344CB8AC3E}">
-        <p14:creationId xmlns:p14="http://schemas.microsoft.com/office/powerpoint/2010/main" xmlns="" val="621218892"/>
+        <p14:creationId xmlns="" xmlns:p14="http://schemas.microsoft.com/office/powerpoint/2010/main" val="621218892"/>
       </p:ext>
     </p:extLst>
   </p:cSld>
@@ -2750,112 +2762,66 @@
           <a:lstStyle/>
           <a:p>
             <a:r>
-              <a:rPr lang="de-DE" dirty="0" smtClean="0"/>
-              <a:t>Warum </a:t>
-            </a:r>
-            <a:r>
-              <a:rPr lang="de-DE" dirty="0" err="1" smtClean="0"/>
+              <a:rPr lang="de-DE" sz="1800" dirty="0" smtClean="0"/>
+              <a:t>Der </a:t>
+            </a:r>
+            <a:r>
+              <a:rPr lang="de-DE" sz="1800" dirty="0" err="1" smtClean="0"/>
               <a:t>Freifunk</a:t>
             </a:r>
             <a:r>
-              <a:rPr lang="de-DE" dirty="0" smtClean="0"/>
-              <a:t>?</a:t>
-            </a:r>
-          </a:p>
-          <a:p>
-            <a:pPr lvl="1"/>
-            <a:r>
-              <a:rPr lang="de-DE" dirty="0" smtClean="0"/>
-              <a:t>Informations- und Meinungsfreiheit werden in vielen Teilen des Internets eingeschränkt</a:t>
+              <a:rPr lang="de-DE" sz="1800" baseline="0" dirty="0" smtClean="0"/>
+              <a:t> Router</a:t>
+            </a:r>
+            <a:endParaRPr lang="de-DE" sz="1800" dirty="0" smtClean="0"/>
+          </a:p>
+          <a:p>
+            <a:endParaRPr lang="de-DE" dirty="0" smtClean="0"/>
+          </a:p>
+          <a:p>
+            <a:r>
+              <a:rPr lang="de-DE" dirty="0" smtClean="0"/>
+              <a:t>-Es werden handelsübliche</a:t>
             </a:r>
             <a:r>
               <a:rPr lang="de-DE" baseline="0" dirty="0" smtClean="0"/>
-              <a:t> </a:t>
-            </a:r>
-          </a:p>
-          <a:p>
-            <a:pPr lvl="1"/>
+              <a:t> WLAN-Router genutzt (802.11 </a:t>
+            </a:r>
+            <a:r>
+              <a:rPr lang="de-DE" baseline="0" dirty="0" err="1" smtClean="0"/>
+              <a:t>abg</a:t>
+            </a:r>
             <a:r>
               <a:rPr lang="de-DE" baseline="0" dirty="0" smtClean="0"/>
-              <a:t>	Siehe Brasilien, China, arabischer Frühling </a:t>
+              <a:t>)</a:t>
+            </a:r>
+          </a:p>
+          <a:p>
+            <a:endParaRPr lang="de-DE" baseline="0" dirty="0" smtClean="0"/>
+          </a:p>
+          <a:p>
+            <a:r>
+              <a:rPr lang="de-DE" baseline="0" dirty="0" smtClean="0"/>
+              <a:t>-Eigene Firmware wird aufgespielt (</a:t>
             </a:r>
             <a:r>
               <a:rPr lang="de-DE" baseline="0" dirty="0" err="1" smtClean="0"/>
-              <a:t>usw</a:t>
+              <a:t>openWRT</a:t>
             </a:r>
             <a:r>
               <a:rPr lang="de-DE" baseline="0" dirty="0" smtClean="0"/>
-              <a:t> usw.</a:t>
-            </a:r>
-            <a:endParaRPr lang="de-DE" dirty="0" smtClean="0"/>
-          </a:p>
-          <a:p>
-            <a:pPr lvl="1"/>
-            <a:r>
-              <a:rPr lang="de-DE" dirty="0" smtClean="0"/>
-              <a:t>Permanente Massenüberwachung</a:t>
-            </a:r>
-          </a:p>
-          <a:p>
-            <a:pPr lvl="1"/>
-            <a:r>
-              <a:rPr lang="de-DE" dirty="0" smtClean="0"/>
-              <a:t>	</a:t>
-            </a:r>
-            <a:r>
-              <a:rPr lang="de-DE" dirty="0" err="1" smtClean="0"/>
-              <a:t>Snowden</a:t>
-            </a:r>
-            <a:r>
-              <a:rPr lang="de-DE" dirty="0" smtClean="0"/>
-              <a:t> </a:t>
-            </a:r>
-          </a:p>
-          <a:p>
-            <a:pPr lvl="1"/>
-            <a:r>
-              <a:rPr lang="de-DE" dirty="0" smtClean="0"/>
-              <a:t>Digitale Kluft wird immer größer</a:t>
-            </a:r>
-          </a:p>
-          <a:p>
-            <a:pPr lvl="1"/>
-            <a:r>
-              <a:rPr lang="de-DE" dirty="0" smtClean="0"/>
-              <a:t>	Wohlhabende Digital</a:t>
-            </a:r>
+              <a:t>)</a:t>
+            </a:r>
+          </a:p>
+          <a:p>
+            <a:endParaRPr lang="de-DE" baseline="0" dirty="0" smtClean="0"/>
+          </a:p>
+          <a:p>
             <a:r>
               <a:rPr lang="de-DE" baseline="0" dirty="0" smtClean="0"/>
-              <a:t> natives haben das Netz als Zuhause, arme und vor allem ältere Menschen sind vom Internet ausgeschlossen</a:t>
-            </a:r>
-            <a:endParaRPr lang="de-DE" dirty="0" smtClean="0"/>
-          </a:p>
-          <a:p>
-            <a:pPr lvl="1"/>
-            <a:r>
-              <a:rPr lang="de-DE" dirty="0" smtClean="0"/>
-              <a:t>Stagnierender Breitbandausbau</a:t>
-            </a:r>
-          </a:p>
-          <a:p>
-            <a:pPr lvl="1"/>
-            <a:r>
-              <a:rPr lang="de-DE" dirty="0" smtClean="0"/>
-              <a:t>	Deutschland ist Schlusslicht in der EU</a:t>
-            </a:r>
-          </a:p>
-          <a:p>
-            <a:pPr lvl="1"/>
-            <a:r>
-              <a:rPr lang="de-DE" dirty="0" smtClean="0">
-                <a:solidFill>
-                  <a:schemeClr val="bg1">
-                    <a:lumMod val="75000"/>
-                  </a:schemeClr>
-                </a:solidFill>
-              </a:rPr>
-              <a:t>Es macht Spaß ;)</a:t>
-            </a:r>
+              <a:t>-Es gibt diese Router überall, im Büro, am Fenster (siehe Bild) oder auf der grünen Wiese (siehe Bild)</a:t>
+            </a:r>
+            <a:endParaRPr lang="de-DE" dirty="0"/>
           </a:p>
         </p:txBody>
       </p:sp>
@@ -3014,7 +2980,7 @@
     </p:spTree>
     <p:extLst>
       <p:ext uri="{BB962C8B-B14F-4D97-AF65-F5344CB8AC3E}">
-        <p14:creationId xmlns:p14="http://schemas.microsoft.com/office/powerpoint/2010/main" xmlns="" val="3215337144"/>
+        <p14:creationId xmlns="" xmlns:p14="http://schemas.microsoft.com/office/powerpoint/2010/main" val="3215337144"/>
       </p:ext>
     </p:extLst>
   </p:cSld>
@@ -3178,7 +3144,7 @@
     </p:spTree>
     <p:extLst>
       <p:ext uri="{BB962C8B-B14F-4D97-AF65-F5344CB8AC3E}">
-        <p14:creationId xmlns:p14="http://schemas.microsoft.com/office/powerpoint/2010/main" xmlns="" val="1980471141"/>
+        <p14:creationId xmlns="" xmlns:p14="http://schemas.microsoft.com/office/powerpoint/2010/main" val="1980471141"/>
       </p:ext>
     </p:extLst>
   </p:cSld>
@@ -3370,7 +3336,7 @@
     </p:spTree>
     <p:extLst>
       <p:ext uri="{BB962C8B-B14F-4D97-AF65-F5344CB8AC3E}">
-        <p14:creationId xmlns:p14="http://schemas.microsoft.com/office/powerpoint/2010/main" xmlns="" val="1094514560"/>
+        <p14:creationId xmlns="" xmlns:p14="http://schemas.microsoft.com/office/powerpoint/2010/main" val="1094514560"/>
       </p:ext>
     </p:extLst>
   </p:cSld>
@@ -3455,7 +3421,7 @@
     </p:spTree>
     <p:extLst>
       <p:ext uri="{BB962C8B-B14F-4D97-AF65-F5344CB8AC3E}">
-        <p14:creationId xmlns:p14="http://schemas.microsoft.com/office/powerpoint/2010/main" xmlns="" val="2849927597"/>
+        <p14:creationId xmlns="" xmlns:p14="http://schemas.microsoft.com/office/powerpoint/2010/main" val="2849927597"/>
       </p:ext>
     </p:extLst>
   </p:cSld>
@@ -3540,7 +3506,7 @@
     </p:spTree>
     <p:extLst>
       <p:ext uri="{BB962C8B-B14F-4D97-AF65-F5344CB8AC3E}">
-        <p14:creationId xmlns:p14="http://schemas.microsoft.com/office/powerpoint/2010/main" xmlns="" val="2819071667"/>
+        <p14:creationId xmlns="" xmlns:p14="http://schemas.microsoft.com/office/powerpoint/2010/main" val="2819071667"/>
       </p:ext>
     </p:extLst>
   </p:cSld>
@@ -3679,66 +3645,101 @@
           <a:lstStyle/>
           <a:p>
             <a:r>
-              <a:rPr lang="de-DE" sz="1800" dirty="0" smtClean="0"/>
-              <a:t>Der </a:t>
-            </a:r>
-            <a:r>
-              <a:rPr lang="de-DE" sz="1800" dirty="0" err="1" smtClean="0"/>
-              <a:t>Freifunk</a:t>
-            </a:r>
-            <a:r>
-              <a:rPr lang="de-DE" sz="1800" baseline="0" dirty="0" smtClean="0"/>
-              <a:t> Router</a:t>
-            </a:r>
-            <a:endParaRPr lang="de-DE" sz="1800" dirty="0" smtClean="0"/>
-          </a:p>
-          <a:p>
+              <a:rPr lang="de-DE" dirty="0" smtClean="0"/>
+              <a:t>Das </a:t>
+            </a:r>
+            <a:r>
+              <a:rPr lang="de-DE" dirty="0" err="1" smtClean="0"/>
+              <a:t>Mesh</a:t>
+            </a:r>
             <a:endParaRPr lang="de-DE" dirty="0" smtClean="0"/>
           </a:p>
           <a:p>
-            <a:r>
-              <a:rPr lang="de-DE" dirty="0" smtClean="0"/>
-              <a:t>-Es werden handelsübliche</a:t>
+            <a:endParaRPr lang="de-DE" dirty="0" smtClean="0"/>
+          </a:p>
+          <a:p>
+            <a:pPr>
+              <a:buFont typeface="Arial" pitchFamily="34" charset="0"/>
+              <a:buChar char="•"/>
+            </a:pPr>
+            <a:r>
+              <a:rPr lang="de-DE" dirty="0" smtClean="0"/>
+              <a:t>„</a:t>
+            </a:r>
+            <a:r>
+              <a:rPr lang="de-DE" dirty="0" err="1" smtClean="0"/>
+              <a:t>Meshnetzwerk</a:t>
+            </a:r>
+            <a:r>
+              <a:rPr lang="de-DE" dirty="0" smtClean="0"/>
+              <a:t>“ zwischen den Routern</a:t>
+            </a:r>
+          </a:p>
+          <a:p>
+            <a:pPr lvl="1">
+              <a:buFont typeface="Arial" pitchFamily="34" charset="0"/>
+              <a:buChar char="•"/>
+            </a:pPr>
+            <a:r>
+              <a:rPr lang="de-DE" dirty="0" err="1" smtClean="0"/>
+              <a:t>Mesh</a:t>
+            </a:r>
+            <a:r>
+              <a:rPr lang="de-DE" dirty="0" smtClean="0"/>
+              <a:t> bedeutet, Router</a:t>
             </a:r>
             <a:r>
               <a:rPr lang="de-DE" baseline="0" dirty="0" smtClean="0"/>
-              <a:t> WLAN-Router genutzt (802.11 </a:t>
+              <a:t> verbinden sich dynamisch je nach Verfügbarkeit untereinander</a:t>
+            </a:r>
+          </a:p>
+          <a:p>
+            <a:pPr lvl="1">
+              <a:buFont typeface="Arial" pitchFamily="34" charset="0"/>
+              <a:buChar char="•"/>
+            </a:pPr>
+            <a:r>
+              <a:rPr lang="de-DE" baseline="0" dirty="0" smtClean="0"/>
+              <a:t>Keine </a:t>
             </a:r>
             <a:r>
               <a:rPr lang="de-DE" baseline="0" dirty="0" err="1" smtClean="0"/>
-              <a:t>abg</a:t>
+              <a:t>Hirarchie</a:t>
             </a:r>
             <a:r>
               <a:rPr lang="de-DE" baseline="0" dirty="0" smtClean="0"/>
-              <a:t>)</a:t>
-            </a:r>
-          </a:p>
-          <a:p>
-            <a:endParaRPr lang="de-DE" baseline="0" dirty="0" smtClean="0"/>
-          </a:p>
-          <a:p>
+              <a:t>, keine Ordnung</a:t>
+            </a:r>
+          </a:p>
+          <a:p>
+            <a:pPr lvl="1">
+              <a:buFont typeface="Arial" pitchFamily="34" charset="0"/>
+              <a:buChar char="•"/>
+            </a:pPr>
             <a:r>
               <a:rPr lang="de-DE" baseline="0" dirty="0" smtClean="0"/>
-              <a:t>-Eigene Firmware wird aufgespielt (</a:t>
-            </a:r>
-            <a:r>
-              <a:rPr lang="de-DE" baseline="0" dirty="0" err="1" smtClean="0"/>
-              <a:t>openWRT</a:t>
-            </a:r>
-            <a:r>
-              <a:rPr lang="de-DE" baseline="0" dirty="0" smtClean="0"/>
-              <a:t>)</a:t>
-            </a:r>
-          </a:p>
-          <a:p>
-            <a:endParaRPr lang="de-DE" baseline="0" dirty="0" smtClean="0"/>
-          </a:p>
-          <a:p>
-            <a:r>
-              <a:rPr lang="de-DE" baseline="0" dirty="0" smtClean="0"/>
-              <a:t>-Es gibt diese Router überall, im Büro, am Fenster (siehe Bild) oder auf der grünen Wiese (siehe Bild)</a:t>
-            </a:r>
-            <a:endParaRPr lang="de-DE" dirty="0"/>
+              <a:t>Technisch ein Ad-Hoc Netz (noch bis 802.11s) über das ein Layer2 Netz läuft</a:t>
+            </a:r>
+          </a:p>
+          <a:p>
+            <a:pPr lvl="1">
+              <a:buFont typeface="Arial" pitchFamily="34" charset="0"/>
+              <a:buNone/>
+            </a:pPr>
+            <a:endParaRPr lang="de-DE" dirty="0" smtClean="0"/>
+          </a:p>
+          <a:p>
+            <a:pPr>
+              <a:buFont typeface="Arial" pitchFamily="34" charset="0"/>
+              <a:buChar char="•"/>
+            </a:pPr>
+            <a:r>
+              <a:rPr lang="de-DE" dirty="0" smtClean="0"/>
+              <a:t>Daten werden über Funk oder Kabel weitergereicht</a:t>
+            </a:r>
+          </a:p>
+          <a:p>
+            <a:endParaRPr lang="de-DE" dirty="0" smtClean="0"/>
           </a:p>
         </p:txBody>
       </p:sp>
@@ -3822,100 +3823,111 @@
           <a:p>
             <a:r>
               <a:rPr lang="de-DE" dirty="0" smtClean="0"/>
-              <a:t>Das </a:t>
+              <a:t>Warum </a:t>
             </a:r>
             <a:r>
               <a:rPr lang="de-DE" dirty="0" err="1" smtClean="0"/>
-              <a:t>Mesh</a:t>
+              <a:t>Freifunk</a:t>
+            </a:r>
+            <a:r>
+              <a:rPr lang="de-DE" dirty="0" smtClean="0"/>
+              <a:t>?</a:t>
+            </a:r>
+          </a:p>
+          <a:p>
+            <a:pPr lvl="1"/>
+            <a:r>
+              <a:rPr lang="de-DE" dirty="0" smtClean="0"/>
+              <a:t>Informations- und Meinungsfreiheit werden in vielen Teilen des Internets eingeschränkt</a:t>
+            </a:r>
+            <a:r>
+              <a:rPr lang="de-DE" baseline="0" dirty="0" smtClean="0"/>
+              <a:t> </a:t>
+            </a:r>
+          </a:p>
+          <a:p>
+            <a:pPr lvl="1"/>
+            <a:r>
+              <a:rPr lang="de-DE" baseline="0" dirty="0" smtClean="0"/>
+              <a:t>	Siehe Brasilien, China, arabischer Frühling </a:t>
+            </a:r>
+            <a:r>
+              <a:rPr lang="de-DE" baseline="0" dirty="0" err="1" smtClean="0"/>
+              <a:t>usw</a:t>
+            </a:r>
+            <a:r>
+              <a:rPr lang="de-DE" baseline="0" dirty="0" smtClean="0"/>
+              <a:t> usw.</a:t>
             </a:r>
             <a:endParaRPr lang="de-DE" dirty="0" smtClean="0"/>
           </a:p>
           <a:p>
+            <a:pPr lvl="1"/>
+            <a:r>
+              <a:rPr lang="de-DE" dirty="0" smtClean="0"/>
+              <a:t>Permanente Massenüberwachung</a:t>
+            </a:r>
+          </a:p>
+          <a:p>
+            <a:pPr lvl="1"/>
+            <a:r>
+              <a:rPr lang="de-DE" dirty="0" smtClean="0"/>
+              <a:t>	</a:t>
+            </a:r>
+            <a:r>
+              <a:rPr lang="de-DE" dirty="0" err="1" smtClean="0"/>
+              <a:t>Snowden</a:t>
+            </a:r>
+            <a:r>
+              <a:rPr lang="de-DE" dirty="0" smtClean="0"/>
+              <a:t> </a:t>
+            </a:r>
+          </a:p>
+          <a:p>
+            <a:pPr lvl="1"/>
+            <a:r>
+              <a:rPr lang="de-DE" dirty="0" smtClean="0"/>
+              <a:t>Digitale Kluft wird immer größer</a:t>
+            </a:r>
+          </a:p>
+          <a:p>
+            <a:pPr lvl="1"/>
+            <a:r>
+              <a:rPr lang="de-DE" dirty="0" smtClean="0"/>
+              <a:t>	Wohlhabende Digital</a:t>
+            </a:r>
+            <a:r>
+              <a:rPr lang="de-DE" baseline="0" dirty="0" smtClean="0"/>
+              <a:t> natives haben das Netz als Zuhause, arme und vor allem ältere Menschen sind vom Internet ausgeschlossen</a:t>
+            </a:r>
             <a:endParaRPr lang="de-DE" dirty="0" smtClean="0"/>
           </a:p>
           <a:p>
-            <a:pPr>
-              <a:buFont typeface="Arial" pitchFamily="34" charset="0"/>
-              <a:buChar char="•"/>
-            </a:pPr>
-            <a:r>
-              <a:rPr lang="de-DE" dirty="0" smtClean="0"/>
-              <a:t>„</a:t>
-            </a:r>
-            <a:r>
-              <a:rPr lang="de-DE" dirty="0" err="1" smtClean="0"/>
-              <a:t>Meshnetzwerk</a:t>
-            </a:r>
-            <a:r>
-              <a:rPr lang="de-DE" dirty="0" smtClean="0"/>
-              <a:t>“ zwischen den Routern</a:t>
-            </a:r>
-          </a:p>
-          <a:p>
-            <a:pPr lvl="1">
-              <a:buFont typeface="Arial" pitchFamily="34" charset="0"/>
-              <a:buChar char="•"/>
-            </a:pPr>
-            <a:r>
-              <a:rPr lang="de-DE" dirty="0" err="1" smtClean="0"/>
-              <a:t>Mesh</a:t>
-            </a:r>
-            <a:r>
-              <a:rPr lang="de-DE" dirty="0" smtClean="0"/>
-              <a:t> bedeutet, Router</a:t>
-            </a:r>
-            <a:r>
-              <a:rPr lang="de-DE" baseline="0" dirty="0" smtClean="0"/>
-              <a:t> verbinden sich dynamisch je nach Verfügbarkeit untereinander</a:t>
-            </a:r>
-          </a:p>
-          <a:p>
-            <a:pPr lvl="1">
-              <a:buFont typeface="Arial" pitchFamily="34" charset="0"/>
-              <a:buChar char="•"/>
-            </a:pPr>
-            <a:r>
-              <a:rPr lang="de-DE" baseline="0" dirty="0" smtClean="0"/>
-              <a:t>Keine </a:t>
-            </a:r>
-            <a:r>
-              <a:rPr lang="de-DE" baseline="0" dirty="0" err="1" smtClean="0"/>
-              <a:t>Hirarchie</a:t>
-            </a:r>
-            <a:r>
-              <a:rPr lang="de-DE" baseline="0" dirty="0" smtClean="0"/>
-              <a:t>, keine Ordnung</a:t>
-            </a:r>
-          </a:p>
-          <a:p>
-            <a:pPr lvl="1">
-              <a:buFont typeface="Arial" pitchFamily="34" charset="0"/>
-              <a:buChar char="•"/>
-            </a:pPr>
-            <a:r>
-              <a:rPr lang="de-DE" baseline="0" dirty="0" smtClean="0"/>
-              <a:t>Technisch ein Ad-Hoc Netz (noch bis 802.11s) über das ein Layer2 Netz läuft</a:t>
-            </a:r>
-          </a:p>
-          <a:p>
-            <a:pPr lvl="1">
-              <a:buFont typeface="Arial" pitchFamily="34" charset="0"/>
-              <a:buNone/>
-            </a:pPr>
-            <a:endParaRPr lang="de-DE" dirty="0" smtClean="0"/>
-          </a:p>
-          <a:p>
-            <a:pPr>
-              <a:buFont typeface="Arial" pitchFamily="34" charset="0"/>
-              <a:buChar char="•"/>
-            </a:pPr>
-            <a:r>
-              <a:rPr lang="de-DE" dirty="0" smtClean="0"/>
-              <a:t>Daten werden über Funk oder Kabel weitergereicht</a:t>
-            </a:r>
-          </a:p>
-          <a:p>
-            <a:endParaRPr lang="de-DE" dirty="0" smtClean="0"/>
+            <a:pPr lvl="1"/>
+            <a:r>
+              <a:rPr lang="de-DE" dirty="0" smtClean="0"/>
+              <a:t>Stagnierender Breitbandausbau</a:t>
+            </a:r>
+          </a:p>
+          <a:p>
+            <a:pPr lvl="1"/>
+            <a:r>
+              <a:rPr lang="de-DE" dirty="0" smtClean="0"/>
+              <a:t>	Deutschland ist Schlusslicht in der EU</a:t>
+            </a:r>
+          </a:p>
+          <a:p>
+            <a:pPr lvl="1"/>
+            <a:r>
+              <a:rPr lang="de-DE" dirty="0" smtClean="0">
+                <a:solidFill>
+                  <a:schemeClr val="bg1">
+                    <a:lumMod val="75000"/>
+                  </a:schemeClr>
+                </a:solidFill>
+              </a:rPr>
+              <a:t>Es macht Spaß ;)</a:t>
+            </a:r>
           </a:p>
         </p:txBody>
       </p:sp>
@@ -4481,7 +4493,7 @@
     </p:spTree>
     <p:extLst>
       <p:ext uri="{BB962C8B-B14F-4D97-AF65-F5344CB8AC3E}">
-        <p14:creationId xmlns:p14="http://schemas.microsoft.com/office/powerpoint/2010/main" xmlns="" val="2238965318"/>
+        <p14:creationId xmlns="" xmlns:p14="http://schemas.microsoft.com/office/powerpoint/2010/main" val="2238965318"/>
       </p:ext>
     </p:extLst>
   </p:cSld>
@@ -4711,7 +4723,7 @@
     </p:spTree>
     <p:extLst>
       <p:ext uri="{BB962C8B-B14F-4D97-AF65-F5344CB8AC3E}">
-        <p14:creationId xmlns:p14="http://schemas.microsoft.com/office/powerpoint/2010/main" xmlns="" val="3759764960"/>
+        <p14:creationId xmlns="" xmlns:p14="http://schemas.microsoft.com/office/powerpoint/2010/main" val="3759764960"/>
       </p:ext>
     </p:extLst>
   </p:cSld>
@@ -4886,7 +4898,7 @@
     </p:spTree>
     <p:extLst>
       <p:ext uri="{BB962C8B-B14F-4D97-AF65-F5344CB8AC3E}">
-        <p14:creationId xmlns:p14="http://schemas.microsoft.com/office/powerpoint/2010/main" xmlns="" val="1708734074"/>
+        <p14:creationId xmlns="" xmlns:p14="http://schemas.microsoft.com/office/powerpoint/2010/main" val="1708734074"/>
       </p:ext>
     </p:extLst>
   </p:cSld>
@@ -8149,7 +8161,7 @@
           <a:blip r:embed="rId3" cstate="print">
             <a:extLst>
               <a:ext uri="{28A0092B-C50C-407E-A947-70E740481C1C}">
-                <a14:useLocalDpi xmlns:a14="http://schemas.microsoft.com/office/drawing/2010/main" xmlns="" val="0"/>
+                <a14:useLocalDpi xmlns="" xmlns:a14="http://schemas.microsoft.com/office/drawing/2010/main" val="0"/>
               </a:ext>
             </a:extLst>
           </a:blip>
@@ -8315,7 +8327,7 @@
     </p:spTree>
     <p:extLst>
       <p:ext uri="{BB962C8B-B14F-4D97-AF65-F5344CB8AC3E}">
-        <p14:creationId xmlns:p14="http://schemas.microsoft.com/office/powerpoint/2010/main" xmlns="" val="471060331"/>
+        <p14:creationId xmlns="" xmlns:p14="http://schemas.microsoft.com/office/powerpoint/2010/main" val="471060331"/>
       </p:ext>
     </p:extLst>
   </p:cSld>
@@ -8521,7 +8533,7 @@
           <a:blip r:embed="rId3" cstate="print">
             <a:extLst>
               <a:ext uri="{28A0092B-C50C-407E-A947-70E740481C1C}">
-                <a14:useLocalDpi xmlns:a14="http://schemas.microsoft.com/office/drawing/2010/main" xmlns="" val="0"/>
+                <a14:useLocalDpi xmlns="" xmlns:a14="http://schemas.microsoft.com/office/drawing/2010/main" val="0"/>
               </a:ext>
             </a:extLst>
           </a:blip>
@@ -8539,7 +8551,7 @@
     </p:spTree>
     <p:extLst>
       <p:ext uri="{BB962C8B-B14F-4D97-AF65-F5344CB8AC3E}">
-        <p14:creationId xmlns:p14="http://schemas.microsoft.com/office/powerpoint/2010/main" xmlns="" val="3498276880"/>
+        <p14:creationId xmlns="" xmlns:p14="http://schemas.microsoft.com/office/powerpoint/2010/main" val="3498276880"/>
       </p:ext>
     </p:extLst>
   </p:cSld>
@@ -8734,7 +8746,7 @@
           <a:blip r:embed="rId3" cstate="print">
             <a:extLst>
               <a:ext uri="{28A0092B-C50C-407E-A947-70E740481C1C}">
-                <a14:useLocalDpi xmlns:a14="http://schemas.microsoft.com/office/drawing/2010/main" xmlns="" val="0"/>
+                <a14:useLocalDpi xmlns="" xmlns:a14="http://schemas.microsoft.com/office/drawing/2010/main" val="0"/>
               </a:ext>
             </a:extLst>
           </a:blip>
@@ -8752,7 +8764,7 @@
     </p:spTree>
     <p:extLst>
       <p:ext uri="{BB962C8B-B14F-4D97-AF65-F5344CB8AC3E}">
-        <p14:creationId xmlns:p14="http://schemas.microsoft.com/office/powerpoint/2010/main" xmlns="" val="617393217"/>
+        <p14:creationId xmlns="" xmlns:p14="http://schemas.microsoft.com/office/powerpoint/2010/main" val="617393217"/>
       </p:ext>
     </p:extLst>
   </p:cSld>
@@ -8969,7 +8981,7 @@
           <a:blip r:embed="rId3" cstate="print">
             <a:extLst>
               <a:ext uri="{28A0092B-C50C-407E-A947-70E740481C1C}">
-                <a14:useLocalDpi xmlns:a14="http://schemas.microsoft.com/office/drawing/2010/main" xmlns="" val="0"/>
+                <a14:useLocalDpi xmlns="" xmlns:a14="http://schemas.microsoft.com/office/drawing/2010/main" val="0"/>
               </a:ext>
             </a:extLst>
           </a:blip>
@@ -8987,7 +8999,7 @@
     </p:spTree>
     <p:extLst>
       <p:ext uri="{BB962C8B-B14F-4D97-AF65-F5344CB8AC3E}">
-        <p14:creationId xmlns:p14="http://schemas.microsoft.com/office/powerpoint/2010/main" xmlns="" val="1281731853"/>
+        <p14:creationId xmlns="" xmlns:p14="http://schemas.microsoft.com/office/powerpoint/2010/main" val="1281731853"/>
       </p:ext>
     </p:extLst>
   </p:cSld>
@@ -9211,7 +9223,7 @@
           <a:effectLst/>
           <a:extLst>
             <a:ext uri="{91240B29-F687-4F45-9708-019B960494DF}">
-              <a14:hiddenLine xmlns:a14="http://schemas.microsoft.com/office/drawing/2010/main" xmlns="" w="9525">
+              <a14:hiddenLine xmlns="" xmlns:a14="http://schemas.microsoft.com/office/drawing/2010/main" w="9525">
                 <a:solidFill>
                   <a:schemeClr val="tx1"/>
                 </a:solidFill>
@@ -9221,7 +9233,7 @@
               </a14:hiddenLine>
             </a:ext>
             <a:ext uri="{AF507438-7753-43E0-B8FC-AC1667EBCBE1}">
-              <a14:hiddenEffects xmlns:a14="http://schemas.microsoft.com/office/drawing/2010/main" xmlns="">
+              <a14:hiddenEffects xmlns="" xmlns:a14="http://schemas.microsoft.com/office/drawing/2010/main">
                 <a:effectLst>
                   <a:outerShdw dist="35921" dir="2700000" algn="ctr" rotWithShape="0">
                     <a:schemeClr val="bg2"/>
@@ -9895,7 +9907,7 @@
     </p:spTree>
     <p:extLst>
       <p:ext uri="{BB962C8B-B14F-4D97-AF65-F5344CB8AC3E}">
-        <p14:creationId xmlns:p14="http://schemas.microsoft.com/office/powerpoint/2010/main" xmlns="" val="2156069298"/>
+        <p14:creationId xmlns="" xmlns:p14="http://schemas.microsoft.com/office/powerpoint/2010/main" val="2156069298"/>
       </p:ext>
     </p:extLst>
   </p:cSld>
@@ -11679,7 +11691,7 @@
           <a:effectLst/>
           <a:extLst>
             <a:ext uri="{91240B29-F687-4F45-9708-019B960494DF}">
-              <a14:hiddenLine xmlns:a14="http://schemas.microsoft.com/office/drawing/2010/main" xmlns="" w="9525">
+              <a14:hiddenLine xmlns="" xmlns:a14="http://schemas.microsoft.com/office/drawing/2010/main" w="9525">
                 <a:solidFill>
                   <a:schemeClr val="tx1"/>
                 </a:solidFill>
@@ -11689,7 +11701,7 @@
               </a14:hiddenLine>
             </a:ext>
             <a:ext uri="{AF507438-7753-43E0-B8FC-AC1667EBCBE1}">
-              <a14:hiddenEffects xmlns:a14="http://schemas.microsoft.com/office/drawing/2010/main" xmlns="">
+              <a14:hiddenEffects xmlns="" xmlns:a14="http://schemas.microsoft.com/office/drawing/2010/main">
                 <a:effectLst>
                   <a:outerShdw dist="35921" dir="2700000" algn="ctr" rotWithShape="0">
                     <a:schemeClr val="bg2"/>
@@ -11859,7 +11871,7 @@
           <a:effectLst/>
           <a:extLst>
             <a:ext uri="{91240B29-F687-4F45-9708-019B960494DF}">
-              <a14:hiddenLine xmlns:a14="http://schemas.microsoft.com/office/drawing/2010/main" xmlns="" w="9525">
+              <a14:hiddenLine xmlns="" xmlns:a14="http://schemas.microsoft.com/office/drawing/2010/main" w="9525">
                 <a:solidFill>
                   <a:schemeClr val="tx1"/>
                 </a:solidFill>
@@ -11869,7 +11881,7 @@
               </a14:hiddenLine>
             </a:ext>
             <a:ext uri="{AF507438-7753-43E0-B8FC-AC1667EBCBE1}">
-              <a14:hiddenEffects xmlns:a14="http://schemas.microsoft.com/office/drawing/2010/main" xmlns="">
+              <a14:hiddenEffects xmlns="" xmlns:a14="http://schemas.microsoft.com/office/drawing/2010/main">
                 <a:effectLst>
                   <a:outerShdw dist="35921" dir="2700000" algn="ctr" rotWithShape="0">
                     <a:schemeClr val="bg2"/>
@@ -12096,7 +12108,7 @@
           <a:effectLst/>
           <a:extLst>
             <a:ext uri="{91240B29-F687-4F45-9708-019B960494DF}">
-              <a14:hiddenLine xmlns:a14="http://schemas.microsoft.com/office/drawing/2010/main" xmlns="" w="9525">
+              <a14:hiddenLine xmlns="" xmlns:a14="http://schemas.microsoft.com/office/drawing/2010/main" w="9525">
                 <a:solidFill>
                   <a:schemeClr val="tx1"/>
                 </a:solidFill>
@@ -12106,7 +12118,7 @@
               </a14:hiddenLine>
             </a:ext>
             <a:ext uri="{AF507438-7753-43E0-B8FC-AC1667EBCBE1}">
-              <a14:hiddenEffects xmlns:a14="http://schemas.microsoft.com/office/drawing/2010/main" xmlns="">
+              <a14:hiddenEffects xmlns="" xmlns:a14="http://schemas.microsoft.com/office/drawing/2010/main">
                 <a:effectLst>
                   <a:outerShdw dist="35921" dir="2700000" algn="ctr" rotWithShape="0">
                     <a:schemeClr val="bg2"/>
@@ -12291,7 +12303,7 @@
           <a:effectLst/>
           <a:extLst>
             <a:ext uri="{91240B29-F687-4F45-9708-019B960494DF}">
-              <a14:hiddenLine xmlns:a14="http://schemas.microsoft.com/office/drawing/2010/main" xmlns="" w="9525">
+              <a14:hiddenLine xmlns="" xmlns:a14="http://schemas.microsoft.com/office/drawing/2010/main" w="9525">
                 <a:solidFill>
                   <a:schemeClr val="tx1"/>
                 </a:solidFill>
@@ -12301,7 +12313,7 @@
               </a14:hiddenLine>
             </a:ext>
             <a:ext uri="{AF507438-7753-43E0-B8FC-AC1667EBCBE1}">
-              <a14:hiddenEffects xmlns:a14="http://schemas.microsoft.com/office/drawing/2010/main" xmlns="">
+              <a14:hiddenEffects xmlns="" xmlns:a14="http://schemas.microsoft.com/office/drawing/2010/main">
                 <a:effectLst>
                   <a:outerShdw dist="35921" dir="2700000" algn="ctr" rotWithShape="0">
                     <a:schemeClr val="bg2"/>
@@ -12677,7 +12689,7 @@
           <a:blip r:embed="rId3" cstate="print">
             <a:extLst>
               <a:ext uri="{28A0092B-C50C-407E-A947-70E740481C1C}">
-                <a14:useLocalDpi xmlns:a14="http://schemas.microsoft.com/office/drawing/2010/main" xmlns="" val="0"/>
+                <a14:useLocalDpi xmlns="" xmlns:a14="http://schemas.microsoft.com/office/drawing/2010/main" val="0"/>
               </a:ext>
             </a:extLst>
           </a:blip>
@@ -12697,7 +12709,7 @@
           <a:noFill/>
           <a:extLst>
             <a:ext uri="{909E8E84-426E-40DD-AFC4-6F175D3DCCD1}">
-              <a14:hiddenFill xmlns:a14="http://schemas.microsoft.com/office/drawing/2010/main" xmlns="">
+              <a14:hiddenFill xmlns="" xmlns:a14="http://schemas.microsoft.com/office/drawing/2010/main">
                 <a:solidFill>
                   <a:srgbClr val="FFFFFF"/>
                 </a:solidFill>
@@ -12895,7 +12907,7 @@
           <a:effectLst/>
           <a:extLst>
             <a:ext uri="{91240B29-F687-4F45-9708-019B960494DF}">
-              <a14:hiddenLine xmlns:a14="http://schemas.microsoft.com/office/drawing/2010/main" xmlns="" w="9525">
+              <a14:hiddenLine xmlns="" xmlns:a14="http://schemas.microsoft.com/office/drawing/2010/main" w="9525">
                 <a:solidFill>
                   <a:schemeClr val="tx1"/>
                 </a:solidFill>
@@ -12905,7 +12917,7 @@
               </a14:hiddenLine>
             </a:ext>
             <a:ext uri="{AF507438-7753-43E0-B8FC-AC1667EBCBE1}">
-              <a14:hiddenEffects xmlns:a14="http://schemas.microsoft.com/office/drawing/2010/main" xmlns="">
+              <a14:hiddenEffects xmlns="" xmlns:a14="http://schemas.microsoft.com/office/drawing/2010/main">
                 <a:effectLst>
                   <a:outerShdw dist="35921" dir="2700000" algn="ctr" rotWithShape="0">
                     <a:schemeClr val="bg2"/>
@@ -13826,7 +13838,7 @@
           <a:blip r:embed="rId3" cstate="print">
             <a:extLst>
               <a:ext uri="{28A0092B-C50C-407E-A947-70E740481C1C}">
-                <a14:useLocalDpi xmlns:a14="http://schemas.microsoft.com/office/drawing/2010/main" xmlns="" val="0"/>
+                <a14:useLocalDpi xmlns="" xmlns:a14="http://schemas.microsoft.com/office/drawing/2010/main" val="0"/>
               </a:ext>
             </a:extLst>
           </a:blip>
@@ -13846,7 +13858,7 @@
           <a:noFill/>
           <a:extLst>
             <a:ext uri="{909E8E84-426E-40DD-AFC4-6F175D3DCCD1}">
-              <a14:hiddenFill xmlns:a14="http://schemas.microsoft.com/office/drawing/2010/main" xmlns="">
+              <a14:hiddenFill xmlns="" xmlns:a14="http://schemas.microsoft.com/office/drawing/2010/main">
                 <a:solidFill>
                   <a:srgbClr val="FFFFFF"/>
                 </a:solidFill>
@@ -14047,7 +14059,7 @@
           <a:blip r:embed="rId3" cstate="print">
             <a:extLst>
               <a:ext uri="{28A0092B-C50C-407E-A947-70E740481C1C}">
-                <a14:useLocalDpi xmlns:a14="http://schemas.microsoft.com/office/drawing/2010/main" xmlns="" val="0"/>
+                <a14:useLocalDpi xmlns="" xmlns:a14="http://schemas.microsoft.com/office/drawing/2010/main" val="0"/>
               </a:ext>
             </a:extLst>
           </a:blip>
@@ -14067,7 +14079,7 @@
           <a:noFill/>
           <a:extLst>
             <a:ext uri="{909E8E84-426E-40DD-AFC4-6F175D3DCCD1}">
-              <a14:hiddenFill xmlns:a14="http://schemas.microsoft.com/office/drawing/2010/main" xmlns="">
+              <a14:hiddenFill xmlns="" xmlns:a14="http://schemas.microsoft.com/office/drawing/2010/main">
                 <a:solidFill>
                   <a:srgbClr val="FFFFFF"/>
                 </a:solidFill>
@@ -14101,7 +14113,7 @@
           <a:effectLst/>
           <a:extLst>
             <a:ext uri="{91240B29-F687-4F45-9708-019B960494DF}">
-              <a14:hiddenLine xmlns:a14="http://schemas.microsoft.com/office/drawing/2010/main" xmlns="" w="9525">
+              <a14:hiddenLine xmlns="" xmlns:a14="http://schemas.microsoft.com/office/drawing/2010/main" w="9525">
                 <a:solidFill>
                   <a:schemeClr val="tx1"/>
                 </a:solidFill>
@@ -14111,7 +14123,7 @@
               </a14:hiddenLine>
             </a:ext>
             <a:ext uri="{AF507438-7753-43E0-B8FC-AC1667EBCBE1}">
-              <a14:hiddenEffects xmlns:a14="http://schemas.microsoft.com/office/drawing/2010/main" xmlns="">
+              <a14:hiddenEffects xmlns="" xmlns:a14="http://schemas.microsoft.com/office/drawing/2010/main">
                 <a:effectLst>
                   <a:outerShdw dist="35921" dir="2700000" algn="ctr" rotWithShape="0">
                     <a:schemeClr val="bg2"/>
@@ -14338,7 +14350,7 @@
           <a:effectLst/>
           <a:extLst>
             <a:ext uri="{91240B29-F687-4F45-9708-019B960494DF}">
-              <a14:hiddenLine xmlns:a14="http://schemas.microsoft.com/office/drawing/2010/main" xmlns="" w="9525">
+              <a14:hiddenLine xmlns="" xmlns:a14="http://schemas.microsoft.com/office/drawing/2010/main" w="9525">
                 <a:solidFill>
                   <a:schemeClr val="tx1"/>
                 </a:solidFill>
@@ -14348,7 +14360,7 @@
               </a14:hiddenLine>
             </a:ext>
             <a:ext uri="{AF507438-7753-43E0-B8FC-AC1667EBCBE1}">
-              <a14:hiddenEffects xmlns:a14="http://schemas.microsoft.com/office/drawing/2010/main" xmlns="">
+              <a14:hiddenEffects xmlns="" xmlns:a14="http://schemas.microsoft.com/office/drawing/2010/main">
                 <a:effectLst>
                   <a:outerShdw dist="35921" dir="2700000" algn="ctr" rotWithShape="0">
                     <a:schemeClr val="bg2"/>
@@ -14659,7 +14671,7 @@
           <a:effectLst/>
           <a:extLst>
             <a:ext uri="{91240B29-F687-4F45-9708-019B960494DF}">
-              <a14:hiddenLine xmlns:a14="http://schemas.microsoft.com/office/drawing/2010/main" xmlns="" w="9525">
+              <a14:hiddenLine xmlns="" xmlns:a14="http://schemas.microsoft.com/office/drawing/2010/main" w="9525">
                 <a:solidFill>
                   <a:schemeClr val="tx1"/>
                 </a:solidFill>
@@ -14669,7 +14681,7 @@
               </a14:hiddenLine>
             </a:ext>
             <a:ext uri="{AF507438-7753-43E0-B8FC-AC1667EBCBE1}">
-              <a14:hiddenEffects xmlns:a14="http://schemas.microsoft.com/office/drawing/2010/main" xmlns="">
+              <a14:hiddenEffects xmlns="" xmlns:a14="http://schemas.microsoft.com/office/drawing/2010/main">
                 <a:effectLst>
                   <a:outerShdw dist="35921" dir="2700000" algn="ctr" rotWithShape="0">
                     <a:schemeClr val="bg2"/>
@@ -15160,7 +15172,7 @@
           <a:effectLst/>
           <a:extLst>
             <a:ext uri="{91240B29-F687-4F45-9708-019B960494DF}">
-              <a14:hiddenLine xmlns:a14="http://schemas.microsoft.com/office/drawing/2010/main" xmlns="" w="9525">
+              <a14:hiddenLine xmlns="" xmlns:a14="http://schemas.microsoft.com/office/drawing/2010/main" w="9525">
                 <a:solidFill>
                   <a:schemeClr val="tx1"/>
                 </a:solidFill>
@@ -15170,7 +15182,7 @@
               </a14:hiddenLine>
             </a:ext>
             <a:ext uri="{AF507438-7753-43E0-B8FC-AC1667EBCBE1}">
-              <a14:hiddenEffects xmlns:a14="http://schemas.microsoft.com/office/drawing/2010/main" xmlns="">
+              <a14:hiddenEffects xmlns="" xmlns:a14="http://schemas.microsoft.com/office/drawing/2010/main">
                 <a:effectLst>
                   <a:outerShdw dist="35921" dir="2700000" algn="ctr" rotWithShape="0">
                     <a:schemeClr val="bg2"/>
@@ -15646,7 +15658,7 @@
           <a:effectLst/>
           <a:extLst>
             <a:ext uri="{91240B29-F687-4F45-9708-019B960494DF}">
-              <a14:hiddenLine xmlns:a14="http://schemas.microsoft.com/office/drawing/2010/main" xmlns="" w="9525">
+              <a14:hiddenLine xmlns="" xmlns:a14="http://schemas.microsoft.com/office/drawing/2010/main" w="9525">
                 <a:solidFill>
                   <a:schemeClr val="tx1"/>
                 </a:solidFill>
@@ -15656,7 +15668,7 @@
               </a14:hiddenLine>
             </a:ext>
             <a:ext uri="{AF507438-7753-43E0-B8FC-AC1667EBCBE1}">
-              <a14:hiddenEffects xmlns:a14="http://schemas.microsoft.com/office/drawing/2010/main" xmlns="">
+              <a14:hiddenEffects xmlns="" xmlns:a14="http://schemas.microsoft.com/office/drawing/2010/main">
                 <a:effectLst>
                   <a:outerShdw dist="35921" dir="2700000" algn="ctr" rotWithShape="0">
                     <a:schemeClr val="bg2"/>
@@ -16581,7 +16593,7 @@
           <a:effectLst/>
           <a:extLst>
             <a:ext uri="{91240B29-F687-4F45-9708-019B960494DF}">
-              <a14:hiddenLine xmlns:a14="http://schemas.microsoft.com/office/drawing/2010/main" xmlns="" w="9525">
+              <a14:hiddenLine xmlns="" xmlns:a14="http://schemas.microsoft.com/office/drawing/2010/main" w="9525">
                 <a:solidFill>
                   <a:schemeClr val="tx1"/>
                 </a:solidFill>
@@ -16591,7 +16603,7 @@
               </a14:hiddenLine>
             </a:ext>
             <a:ext uri="{AF507438-7753-43E0-B8FC-AC1667EBCBE1}">
-              <a14:hiddenEffects xmlns:a14="http://schemas.microsoft.com/office/drawing/2010/main" xmlns="">
+              <a14:hiddenEffects xmlns="" xmlns:a14="http://schemas.microsoft.com/office/drawing/2010/main">
                 <a:effectLst>
                   <a:outerShdw dist="35921" dir="2700000" algn="ctr" rotWithShape="0">
                     <a:schemeClr val="bg2"/>
@@ -18634,13 +18646,7 @@
               <a:rPr lang="de-DE" dirty="0" smtClean="0">
                 <a:hlinkClick r:id="rId8"/>
               </a:rPr>
-              <a:t>https://</a:t>
-            </a:r>
-            <a:r>
-              <a:rPr lang="de-DE" dirty="0" smtClean="0">
-                <a:hlinkClick r:id="rId8"/>
-              </a:rPr>
-              <a:t>de.wikipedia.org/wiki/Testgetriebene_Entwicklung</a:t>
+              <a:t>https://de.wikipedia.org/wiki/Testgetriebene_Entwicklung</a:t>
             </a:r>
             <a:endParaRPr lang="de-DE" dirty="0" smtClean="0"/>
           </a:p>
@@ -18649,13 +18655,7 @@
               <a:rPr lang="de-DE" dirty="0" smtClean="0">
                 <a:hlinkClick r:id="rId9"/>
               </a:rPr>
-              <a:t>https://</a:t>
-            </a:r>
-            <a:r>
-              <a:rPr lang="de-DE" dirty="0" smtClean="0">
-                <a:hlinkClick r:id="rId9"/>
-              </a:rPr>
-              <a:t>github.com/FreifunkBremen/logo</a:t>
+              <a:t>https://github.com/FreifunkBremen/logo</a:t>
             </a:r>
             <a:endParaRPr lang="de-DE" dirty="0" smtClean="0"/>
           </a:p>
@@ -18686,180 +18686,6 @@
 </file>
 
 <file path=ppt/slides/slide4.xml><?xml version="1.0" encoding="utf-8"?>
-<p:sld xmlns:a="http://schemas.openxmlformats.org/drawingml/2006/main" xmlns:r="http://schemas.openxmlformats.org/officeDocument/2006/relationships" xmlns:p="http://schemas.openxmlformats.org/presentationml/2006/main">
-  <p:cSld>
-    <p:spTree>
-      <p:nvGrpSpPr>
-        <p:cNvPr id="1" name=""/>
-        <p:cNvGrpSpPr/>
-        <p:nvPr/>
-      </p:nvGrpSpPr>
-      <p:grpSpPr>
-        <a:xfrm>
-          <a:off x="0" y="0"/>
-          <a:ext cx="0" cy="0"/>
-          <a:chOff x="0" y="0"/>
-          <a:chExt cx="0" cy="0"/>
-        </a:xfrm>
-      </p:grpSpPr>
-      <p:sp>
-        <p:nvSpPr>
-          <p:cNvPr id="2" name="Titel 1"/>
-          <p:cNvSpPr>
-            <a:spLocks noGrp="1"/>
-          </p:cNvSpPr>
-          <p:nvPr>
-            <p:ph type="title"/>
-          </p:nvPr>
-        </p:nvSpPr>
-        <p:spPr/>
-        <p:txBody>
-          <a:bodyPr>
-            <a:normAutofit/>
-          </a:bodyPr>
-          <a:lstStyle/>
-          <a:p>
-            <a:r>
-              <a:rPr lang="de-DE" dirty="0" err="1" smtClean="0"/>
-              <a:t>Freifunk</a:t>
-            </a:r>
-            <a:r>
-              <a:rPr lang="de-DE" dirty="0" smtClean="0"/>
-              <a:t> Bremen</a:t>
-            </a:r>
-            <a:endParaRPr lang="de-DE" dirty="0"/>
-          </a:p>
-        </p:txBody>
-      </p:sp>
-      <p:sp>
-        <p:nvSpPr>
-          <p:cNvPr id="3" name="Inhaltsplatzhalter 2"/>
-          <p:cNvSpPr>
-            <a:spLocks noGrp="1"/>
-          </p:cNvSpPr>
-          <p:nvPr>
-            <p:ph idx="1"/>
-          </p:nvPr>
-        </p:nvSpPr>
-        <p:spPr/>
-        <p:txBody>
-          <a:bodyPr>
-            <a:normAutofit lnSpcReduction="10000"/>
-          </a:bodyPr>
-          <a:lstStyle/>
-          <a:p>
-            <a:r>
-              <a:rPr lang="de-DE" dirty="0" smtClean="0"/>
-              <a:t>Warum </a:t>
-            </a:r>
-            <a:r>
-              <a:rPr lang="de-DE" dirty="0" err="1" smtClean="0"/>
-              <a:t>Freifunk</a:t>
-            </a:r>
-            <a:r>
-              <a:rPr lang="de-DE" dirty="0" smtClean="0"/>
-              <a:t>?</a:t>
-            </a:r>
-          </a:p>
-          <a:p>
-            <a:pPr lvl="1"/>
-            <a:r>
-              <a:rPr lang="de-DE" dirty="0" smtClean="0"/>
-              <a:t>Informations- und Meinungsfreiheit werden in vielen Teilen des Internets eingeschränkt</a:t>
-            </a:r>
-          </a:p>
-          <a:p>
-            <a:pPr lvl="1"/>
-            <a:r>
-              <a:rPr lang="de-DE" dirty="0" smtClean="0"/>
-              <a:t>Permanente Massenüberwachung</a:t>
-            </a:r>
-          </a:p>
-          <a:p>
-            <a:pPr lvl="1"/>
-            <a:r>
-              <a:rPr lang="de-DE" dirty="0" smtClean="0"/>
-              <a:t>Digitale Kluft wird immer größer</a:t>
-            </a:r>
-          </a:p>
-          <a:p>
-            <a:pPr lvl="1"/>
-            <a:r>
-              <a:rPr lang="de-DE" dirty="0" smtClean="0"/>
-              <a:t>Stagnierender Breitbandausbau</a:t>
-            </a:r>
-          </a:p>
-          <a:p>
-            <a:pPr lvl="1"/>
-            <a:r>
-              <a:rPr lang="de-DE" dirty="0" smtClean="0">
-                <a:solidFill>
-                  <a:schemeClr val="bg1">
-                    <a:lumMod val="75000"/>
-                  </a:schemeClr>
-                </a:solidFill>
-              </a:rPr>
-              <a:t>Es macht Spaß ;)</a:t>
-            </a:r>
-          </a:p>
-        </p:txBody>
-      </p:sp>
-      <p:sp>
-        <p:nvSpPr>
-          <p:cNvPr id="4" name="Ellipse 3"/>
-          <p:cNvSpPr/>
-          <p:nvPr/>
-        </p:nvSpPr>
-        <p:spPr>
-          <a:xfrm>
-            <a:off x="-36512" y="5020022"/>
-            <a:ext cx="179512" cy="144016"/>
-          </a:xfrm>
-          <a:prstGeom prst="ellipse">
-            <a:avLst/>
-          </a:prstGeom>
-        </p:spPr>
-        <p:style>
-          <a:lnRef idx="2">
-            <a:schemeClr val="accent1">
-              <a:shade val="50000"/>
-            </a:schemeClr>
-          </a:lnRef>
-          <a:fillRef idx="1">
-            <a:schemeClr val="accent1"/>
-          </a:fillRef>
-          <a:effectRef idx="0">
-            <a:schemeClr val="accent1"/>
-          </a:effectRef>
-          <a:fontRef idx="minor">
-            <a:schemeClr val="lt1"/>
-          </a:fontRef>
-        </p:style>
-        <p:txBody>
-          <a:bodyPr rtlCol="0" anchor="ctr"/>
-          <a:lstStyle/>
-          <a:p>
-            <a:pPr algn="ctr"/>
-            <a:endParaRPr lang="de-DE"/>
-          </a:p>
-        </p:txBody>
-      </p:sp>
-    </p:spTree>
-  </p:cSld>
-  <p:clrMapOvr>
-    <a:masterClrMapping/>
-  </p:clrMapOvr>
-  <p:timing>
-    <p:tnLst>
-      <p:par>
-        <p:cTn id="1" dur="indefinite" restart="never" nodeType="tmRoot"/>
-      </p:par>
-    </p:tnLst>
-  </p:timing>
-</p:sld>
-</file>
-
-<file path=ppt/slides/slide5.xml><?xml version="1.0" encoding="utf-8"?>
 <p:sld xmlns:a="http://schemas.openxmlformats.org/drawingml/2006/main" xmlns:r="http://schemas.openxmlformats.org/officeDocument/2006/relationships" xmlns:p="http://schemas.openxmlformats.org/presentationml/2006/main">
   <p:cSld>
     <p:spTree>
@@ -19037,7 +18863,7 @@
 </p:sld>
 </file>
 
-<file path=ppt/slides/slide6.xml><?xml version="1.0" encoding="utf-8"?>
+<file path=ppt/slides/slide5.xml><?xml version="1.0" encoding="utf-8"?>
 <p:sld xmlns:a="http://schemas.openxmlformats.org/drawingml/2006/main" xmlns:r="http://schemas.openxmlformats.org/officeDocument/2006/relationships" xmlns:p="http://schemas.openxmlformats.org/presentationml/2006/main">
   <p:cSld>
     <p:spTree>
@@ -19169,6 +18995,180 @@
       <p:sp>
         <p:nvSpPr>
           <p:cNvPr id="5" name="Ellipse 4"/>
+          <p:cNvSpPr/>
+          <p:nvPr/>
+        </p:nvSpPr>
+        <p:spPr>
+          <a:xfrm>
+            <a:off x="-36512" y="5020022"/>
+            <a:ext cx="179512" cy="144016"/>
+          </a:xfrm>
+          <a:prstGeom prst="ellipse">
+            <a:avLst/>
+          </a:prstGeom>
+        </p:spPr>
+        <p:style>
+          <a:lnRef idx="2">
+            <a:schemeClr val="accent1">
+              <a:shade val="50000"/>
+            </a:schemeClr>
+          </a:lnRef>
+          <a:fillRef idx="1">
+            <a:schemeClr val="accent1"/>
+          </a:fillRef>
+          <a:effectRef idx="0">
+            <a:schemeClr val="accent1"/>
+          </a:effectRef>
+          <a:fontRef idx="minor">
+            <a:schemeClr val="lt1"/>
+          </a:fontRef>
+        </p:style>
+        <p:txBody>
+          <a:bodyPr rtlCol="0" anchor="ctr"/>
+          <a:lstStyle/>
+          <a:p>
+            <a:pPr algn="ctr"/>
+            <a:endParaRPr lang="de-DE"/>
+          </a:p>
+        </p:txBody>
+      </p:sp>
+    </p:spTree>
+  </p:cSld>
+  <p:clrMapOvr>
+    <a:masterClrMapping/>
+  </p:clrMapOvr>
+  <p:timing>
+    <p:tnLst>
+      <p:par>
+        <p:cTn id="1" dur="indefinite" restart="never" nodeType="tmRoot"/>
+      </p:par>
+    </p:tnLst>
+  </p:timing>
+</p:sld>
+</file>
+
+<file path=ppt/slides/slide6.xml><?xml version="1.0" encoding="utf-8"?>
+<p:sld xmlns:a="http://schemas.openxmlformats.org/drawingml/2006/main" xmlns:r="http://schemas.openxmlformats.org/officeDocument/2006/relationships" xmlns:p="http://schemas.openxmlformats.org/presentationml/2006/main">
+  <p:cSld>
+    <p:spTree>
+      <p:nvGrpSpPr>
+        <p:cNvPr id="1" name=""/>
+        <p:cNvGrpSpPr/>
+        <p:nvPr/>
+      </p:nvGrpSpPr>
+      <p:grpSpPr>
+        <a:xfrm>
+          <a:off x="0" y="0"/>
+          <a:ext cx="0" cy="0"/>
+          <a:chOff x="0" y="0"/>
+          <a:chExt cx="0" cy="0"/>
+        </a:xfrm>
+      </p:grpSpPr>
+      <p:sp>
+        <p:nvSpPr>
+          <p:cNvPr id="2" name="Titel 1"/>
+          <p:cNvSpPr>
+            <a:spLocks noGrp="1"/>
+          </p:cNvSpPr>
+          <p:nvPr>
+            <p:ph type="title"/>
+          </p:nvPr>
+        </p:nvSpPr>
+        <p:spPr/>
+        <p:txBody>
+          <a:bodyPr>
+            <a:normAutofit/>
+          </a:bodyPr>
+          <a:lstStyle/>
+          <a:p>
+            <a:r>
+              <a:rPr lang="de-DE" dirty="0" err="1" smtClean="0"/>
+              <a:t>Freifunk</a:t>
+            </a:r>
+            <a:r>
+              <a:rPr lang="de-DE" dirty="0" smtClean="0"/>
+              <a:t> Bremen</a:t>
+            </a:r>
+            <a:endParaRPr lang="de-DE" dirty="0"/>
+          </a:p>
+        </p:txBody>
+      </p:sp>
+      <p:sp>
+        <p:nvSpPr>
+          <p:cNvPr id="3" name="Inhaltsplatzhalter 2"/>
+          <p:cNvSpPr>
+            <a:spLocks noGrp="1"/>
+          </p:cNvSpPr>
+          <p:nvPr>
+            <p:ph idx="1"/>
+          </p:nvPr>
+        </p:nvSpPr>
+        <p:spPr/>
+        <p:txBody>
+          <a:bodyPr>
+            <a:normAutofit lnSpcReduction="10000"/>
+          </a:bodyPr>
+          <a:lstStyle/>
+          <a:p>
+            <a:r>
+              <a:rPr lang="de-DE" dirty="0" smtClean="0"/>
+              <a:t>Warum </a:t>
+            </a:r>
+            <a:r>
+              <a:rPr lang="de-DE" dirty="0" err="1" smtClean="0"/>
+              <a:t>Freifunk</a:t>
+            </a:r>
+            <a:r>
+              <a:rPr lang="de-DE" dirty="0" smtClean="0"/>
+              <a:t>?</a:t>
+            </a:r>
+          </a:p>
+          <a:p>
+            <a:pPr lvl="1"/>
+            <a:r>
+              <a:rPr lang="de-DE" dirty="0" smtClean="0"/>
+              <a:t>Informations- und Meinungsfreiheit werden in vielen Teilen des Internets eingeschränkt</a:t>
+            </a:r>
+          </a:p>
+          <a:p>
+            <a:pPr lvl="1"/>
+            <a:r>
+              <a:rPr lang="de-DE" dirty="0" smtClean="0"/>
+              <a:t>Permanente Massenüberwachung</a:t>
+            </a:r>
+          </a:p>
+          <a:p>
+            <a:pPr lvl="1"/>
+            <a:r>
+              <a:rPr lang="de-DE" dirty="0" smtClean="0"/>
+              <a:t>Digitale Kluft wird immer größer</a:t>
+            </a:r>
+          </a:p>
+          <a:p>
+            <a:pPr lvl="1"/>
+            <a:r>
+              <a:rPr lang="de-DE" dirty="0" smtClean="0"/>
+              <a:t>Stagnierender Breitbandausbau</a:t>
+            </a:r>
+          </a:p>
+          <a:p>
+            <a:pPr lvl="1"/>
+            <a:r>
+              <a:rPr lang="de-DE" dirty="0" smtClean="0">
+                <a:solidFill>
+                  <a:schemeClr val="bg1">
+                    <a:lumMod val="75000"/>
+                  </a:schemeClr>
+                </a:solidFill>
+              </a:rPr>
+              <a:t>Es macht Spaß ;)</a:t>
+            </a:r>
+          </a:p>
+        </p:txBody>
+      </p:sp>
+      <p:sp>
+        <p:nvSpPr>
+          <p:cNvPr id="4" name="Ellipse 3"/>
           <p:cNvSpPr/>
           <p:nvPr/>
         </p:nvSpPr>

</xml_diff>